<commit_message>
Updated metadata for "04. Loops Advanced *"
</commit_message>
<xml_diff>
--- a/Courses/Software-Sciences/Module-1-OOP-New/04-Loops-Advanced/04-Loops-Advanced.pptx
+++ b/Courses/Software-Sciences/Module-1-OOP-New/04-Loops-Advanced/04-Loops-Advanced.pptx
@@ -345,7 +345,7 @@
           <a:p>
             <a:fld id="{4E087215-0C8F-4762-A664-737A353EC9A4}" type="datetimeFigureOut">
               <a:rPr lang="bg-BG" smtClean="0"/>
-              <a:t>2.01.23 г.</a:t>
+              <a:t>18.01.23 г.</a:t>
             </a:fld>
             <a:endParaRPr lang="bg-BG"/>
           </a:p>
@@ -536,7 +536,7 @@
           <a:p>
             <a:fld id="{72D84649-876A-46C9-8472-14CB09C070D8}" type="datetimeFigureOut">
               <a:rPr lang="en-US" smtClean="0"/>
-              <a:t>1/2/23</a:t>
+              <a:t>1/18/23</a:t>
             </a:fld>
             <a:endParaRPr lang="en-US"/>
           </a:p>
@@ -17722,7 +17722,15 @@
             </a:r>
             <a:r>
               <a:rPr lang="bg-BG" sz="2199" dirty="0"/>
-              <a:t>решението в </a:t>
+              <a:t>решението</a:t>
+            </a:r>
+            <a:r>
+              <a:rPr lang="en-US" sz="2199" dirty="0"/>
+              <a:t> </a:t>
+            </a:r>
+            <a:r>
+              <a:rPr lang="bg-BG" sz="2199" dirty="0"/>
+              <a:t>си в </a:t>
             </a:r>
             <a:r>
               <a:rPr lang="en-US" sz="2199" dirty="0"/>
@@ -20482,7 +20490,7 @@
             </a:r>
             <a:r>
               <a:rPr lang="bg-BG" sz="2199" dirty="0"/>
-              <a:t>решението в </a:t>
+              <a:t>решението си в </a:t>
             </a:r>
             <a:r>
               <a:rPr lang="en-US" sz="2199" dirty="0"/>
@@ -26774,7 +26782,7 @@
         <p:spPr bwMode="auto">
           <a:xfrm>
             <a:off x="926877" y="1551776"/>
-            <a:ext cx="10338247" cy="4138922"/>
+            <a:ext cx="10338247" cy="4658224"/>
           </a:xfrm>
           <a:prstGeom prst="rect">
             <a:avLst/>
@@ -26874,7 +26882,67 @@
                 <a:latin typeface="Consolas" pitchFamily="49" charset="0"/>
                 <a:cs typeface="Consolas" pitchFamily="49" charset="0"/>
               </a:rPr>
-              <a:t>//TODO: Print output and exit the loop </a:t>
+              <a:t>//TODO: </a:t>
+            </a:r>
+            <a:r>
+              <a:rPr lang="bg-BG" sz="2399" b="1" noProof="1">
+                <a:solidFill>
+                  <a:schemeClr val="accent2"/>
+                </a:solidFill>
+                <a:latin typeface="Consolas" pitchFamily="49" charset="0"/>
+                <a:cs typeface="Consolas" pitchFamily="49" charset="0"/>
+              </a:rPr>
+              <a:t>Отпечатайте изхода</a:t>
+            </a:r>
+            <a:r>
+              <a:rPr lang="en-US" sz="2399" b="1" noProof="1">
+                <a:solidFill>
+                  <a:schemeClr val="accent2"/>
+                </a:solidFill>
+                <a:latin typeface="Consolas" pitchFamily="49" charset="0"/>
+                <a:cs typeface="Consolas" pitchFamily="49" charset="0"/>
+              </a:rPr>
+              <a:t> </a:t>
+            </a:r>
+            <a:r>
+              <a:rPr lang="bg-BG" sz="2399" b="1" noProof="1">
+                <a:solidFill>
+                  <a:schemeClr val="accent2"/>
+                </a:solidFill>
+                <a:latin typeface="Consolas" pitchFamily="49" charset="0"/>
+                <a:cs typeface="Consolas" pitchFamily="49" charset="0"/>
+              </a:rPr>
+              <a:t>и</a:t>
+            </a:r>
+            <a:r>
+              <a:rPr lang="en-US" sz="2399" b="1" noProof="1">
+                <a:solidFill>
+                  <a:schemeClr val="accent2"/>
+                </a:solidFill>
+                <a:latin typeface="Consolas" pitchFamily="49" charset="0"/>
+                <a:cs typeface="Consolas" pitchFamily="49" charset="0"/>
+              </a:rPr>
+              <a:t> </a:t>
+            </a:r>
+            <a:r>
+              <a:rPr lang="bg-BG" sz="2399" b="1" noProof="1">
+                <a:solidFill>
+                  <a:schemeClr val="accent2"/>
+                </a:solidFill>
+                <a:latin typeface="Consolas" pitchFamily="49" charset="0"/>
+                <a:cs typeface="Consolas" pitchFamily="49" charset="0"/>
+              </a:rPr>
+              <a:t>излезте от цикъла</a:t>
+            </a:r>
+            <a:r>
+              <a:rPr lang="en-US" sz="2399" b="1" noProof="1">
+                <a:solidFill>
+                  <a:schemeClr val="accent2"/>
+                </a:solidFill>
+                <a:latin typeface="Consolas" pitchFamily="49" charset="0"/>
+                <a:cs typeface="Consolas" pitchFamily="49" charset="0"/>
+              </a:rPr>
+              <a:t> </a:t>
             </a:r>
             <a:r>
               <a:rPr lang="en-US" sz="2399" b="1" noProof="1">

</xml_diff>

<commit_message>
Updated slides for "04. Loops - Advanced *"
</commit_message>
<xml_diff>
--- a/Courses/Software-Sciences/Module-1-OOP-New/04-Loops-Advanced/04-Loops-Advanced.pptx
+++ b/Courses/Software-Sciences/Module-1-OOP-New/04-Loops-Advanced/04-Loops-Advanced.pptx
@@ -345,7 +345,7 @@
           <a:p>
             <a:fld id="{4E087215-0C8F-4762-A664-737A353EC9A4}" type="datetimeFigureOut">
               <a:rPr lang="bg-BG" smtClean="0"/>
-              <a:t>18.01.23 г.</a:t>
+              <a:t>19.01.23 г.</a:t>
             </a:fld>
             <a:endParaRPr lang="bg-BG"/>
           </a:p>
@@ -536,7 +536,7 @@
           <a:p>
             <a:fld id="{72D84649-876A-46C9-8472-14CB09C070D8}" type="datetimeFigureOut">
               <a:rPr lang="en-US" smtClean="0"/>
-              <a:t>1/18/23</a:t>
+              <a:t>1/19/23</a:t>
             </a:fld>
             <a:endParaRPr lang="en-US"/>
           </a:p>
@@ -1542,18 +1542,18 @@
           <a:bodyPr/>
           <a:lstStyle/>
           <a:p>
-            <a:endParaRPr lang="en-US"/>
+            <a:endParaRPr lang="en-BG" dirty="0"/>
           </a:p>
         </p:txBody>
       </p:sp>
       <p:sp>
         <p:nvSpPr>
-          <p:cNvPr id="5" name="Slide Number Placeholder 4"/>
+          <p:cNvPr id="4" name="Slide Number Placeholder 3"/>
           <p:cNvSpPr>
             <a:spLocks noGrp="1"/>
           </p:cNvSpPr>
           <p:nvPr>
-            <p:ph type="sldNum" sz="quarter" idx="11"/>
+            <p:ph type="sldNum" sz="quarter" idx="5"/>
           </p:nvPr>
         </p:nvSpPr>
         <p:spPr/>
@@ -1561,10 +1561,9 @@
           <a:bodyPr/>
           <a:lstStyle/>
           <a:p>
-            <a:fld id="{3EBA5BD7-F043-4D1B-AA17-CD412FC534DE}" type="slidenum">
+            <a:fld id="{2BF067CD-8E6B-4360-9AA8-C5DF2A48A6D1}" type="slidenum">
               <a:rPr lang="en-US" smtClean="0"/>
-              <a:pPr/>
-              <a:t>45</a:t>
+              <a:t>38</a:t>
             </a:fld>
             <a:endParaRPr lang="en-US" dirty="0"/>
           </a:p>
@@ -1572,13 +1571,7 @@
       </p:sp>
       <p:sp>
         <p:nvSpPr>
-          <p:cNvPr id="6" name="Footer Placeholder 7">
-            <a:extLst>
-              <a:ext uri="{FF2B5EF4-FFF2-40B4-BE49-F238E27FC236}">
-                <a16:creationId xmlns:a16="http://schemas.microsoft.com/office/drawing/2014/main" id="{98538354-B696-480A-9C9C-21C1195F1A24}"/>
-              </a:ext>
-            </a:extLst>
-          </p:cNvPr>
+          <p:cNvPr id="5" name="Footer Placeholder 4"/>
           <p:cNvSpPr>
             <a:spLocks noGrp="1"/>
           </p:cNvSpPr>
@@ -1586,44 +1579,33 @@
             <p:ph type="ftr" sz="quarter" idx="4"/>
           </p:nvPr>
         </p:nvSpPr>
-        <p:spPr>
-          <a:xfrm>
-            <a:off x="-1" y="8847000"/>
-            <a:ext cx="6488999" cy="297000"/>
-          </a:xfrm>
-          <a:prstGeom prst="rect">
-            <a:avLst/>
-          </a:prstGeom>
-        </p:spPr>
+        <p:spPr/>
         <p:txBody>
-          <a:bodyPr vert="horz" lIns="91440" tIns="45720" rIns="91440" bIns="45720" rtlCol="0" anchor="b"/>
-          <a:lstStyle>
-            <a:lvl1pPr algn="l">
-              <a:defRPr sz="1100"/>
-            </a:lvl1pPr>
-          </a:lstStyle>
-          <a:p>
-            <a:r>
-              <a:rPr lang="en-US" dirty="0"/>
+          <a:bodyPr/>
+          <a:lstStyle/>
+          <a:p>
+            <a:r>
+              <a:rPr lang="en-US"/>
               <a:t>© SoftUni – </a:t>
             </a:r>
             <a:r>
-              <a:rPr lang="en-US" u="sng" dirty="0">
+              <a:rPr lang="en-US" u="sng">
                 <a:hlinkClick r:id="rId3"/>
               </a:rPr>
               <a:t>https://softuni.org</a:t>
             </a:r>
             <a:r>
-              <a:rPr lang="en-US" dirty="0"/>
+              <a:rPr lang="en-US"/>
               <a:t>. Copyrighted document. Unauthorized copy or reproduction is not permitted.</a:t>
             </a:r>
+            <a:endParaRPr lang="en-US" dirty="0"/>
           </a:p>
         </p:txBody>
       </p:sp>
     </p:spTree>
     <p:extLst>
       <p:ext uri="{BB962C8B-B14F-4D97-AF65-F5344CB8AC3E}">
-        <p14:creationId xmlns:p14="http://schemas.microsoft.com/office/powerpoint/2010/main" val="2791254048"/>
+        <p14:creationId xmlns:p14="http://schemas.microsoft.com/office/powerpoint/2010/main" val="3240559256"/>
       </p:ext>
     </p:extLst>
   </p:cSld>
@@ -1683,129 +1665,23 @@
       </p:sp>
       <p:sp>
         <p:nvSpPr>
-          <p:cNvPr id="7" name="Slide Number Placeholder 5">
-            <a:extLst>
-              <a:ext uri="{FF2B5EF4-FFF2-40B4-BE49-F238E27FC236}">
-                <a16:creationId xmlns:a16="http://schemas.microsoft.com/office/drawing/2014/main" id="{5049B984-F964-47FF-8179-0A3007CE21CD}"/>
-              </a:ext>
-            </a:extLst>
-          </p:cNvPr>
-          <p:cNvSpPr txBox="1">
-            <a:spLocks/>
+          <p:cNvPr id="5" name="Slide Number Placeholder 4"/>
+          <p:cNvSpPr>
+            <a:spLocks noGrp="1"/>
           </p:cNvSpPr>
-          <p:nvPr/>
+          <p:nvPr>
+            <p:ph type="sldNum" sz="quarter" idx="11"/>
+          </p:nvPr>
         </p:nvSpPr>
-        <p:spPr>
-          <a:xfrm>
-            <a:off x="6488999" y="8847000"/>
-            <a:ext cx="367414" cy="297000"/>
-          </a:xfrm>
-          <a:prstGeom prst="rect">
-            <a:avLst/>
-          </a:prstGeom>
-        </p:spPr>
+        <p:spPr/>
         <p:txBody>
-          <a:bodyPr vert="horz" lIns="91440" tIns="45720" rIns="91440" bIns="45720" rtlCol="0" anchor="b"/>
-          <a:lstStyle>
-            <a:defPPr>
-              <a:defRPr lang="en-US"/>
-            </a:defPPr>
-            <a:lvl1pPr marL="0" algn="r" defTabSz="914400" rtl="0" eaLnBrk="1" latinLnBrk="0" hangingPunct="1">
-              <a:defRPr sz="1200" kern="1200">
-                <a:solidFill>
-                  <a:schemeClr val="tx1"/>
-                </a:solidFill>
-                <a:latin typeface="+mn-lt"/>
-                <a:ea typeface="+mn-ea"/>
-                <a:cs typeface="+mn-cs"/>
-              </a:defRPr>
-            </a:lvl1pPr>
-            <a:lvl2pPr marL="457200" algn="l" defTabSz="914400" rtl="0" eaLnBrk="1" latinLnBrk="0" hangingPunct="1">
-              <a:defRPr sz="1800" kern="1200">
-                <a:solidFill>
-                  <a:schemeClr val="tx1"/>
-                </a:solidFill>
-                <a:latin typeface="+mn-lt"/>
-                <a:ea typeface="+mn-ea"/>
-                <a:cs typeface="+mn-cs"/>
-              </a:defRPr>
-            </a:lvl2pPr>
-            <a:lvl3pPr marL="914400" algn="l" defTabSz="914400" rtl="0" eaLnBrk="1" latinLnBrk="0" hangingPunct="1">
-              <a:defRPr sz="1800" kern="1200">
-                <a:solidFill>
-                  <a:schemeClr val="tx1"/>
-                </a:solidFill>
-                <a:latin typeface="+mn-lt"/>
-                <a:ea typeface="+mn-ea"/>
-                <a:cs typeface="+mn-cs"/>
-              </a:defRPr>
-            </a:lvl3pPr>
-            <a:lvl4pPr marL="1371600" algn="l" defTabSz="914400" rtl="0" eaLnBrk="1" latinLnBrk="0" hangingPunct="1">
-              <a:defRPr sz="1800" kern="1200">
-                <a:solidFill>
-                  <a:schemeClr val="tx1"/>
-                </a:solidFill>
-                <a:latin typeface="+mn-lt"/>
-                <a:ea typeface="+mn-ea"/>
-                <a:cs typeface="+mn-cs"/>
-              </a:defRPr>
-            </a:lvl4pPr>
-            <a:lvl5pPr marL="1828800" algn="l" defTabSz="914400" rtl="0" eaLnBrk="1" latinLnBrk="0" hangingPunct="1">
-              <a:defRPr sz="1800" kern="1200">
-                <a:solidFill>
-                  <a:schemeClr val="tx1"/>
-                </a:solidFill>
-                <a:latin typeface="+mn-lt"/>
-                <a:ea typeface="+mn-ea"/>
-                <a:cs typeface="+mn-cs"/>
-              </a:defRPr>
-            </a:lvl5pPr>
-            <a:lvl6pPr marL="2286000" algn="l" defTabSz="914400" rtl="0" eaLnBrk="1" latinLnBrk="0" hangingPunct="1">
-              <a:defRPr sz="1800" kern="1200">
-                <a:solidFill>
-                  <a:schemeClr val="tx1"/>
-                </a:solidFill>
-                <a:latin typeface="+mn-lt"/>
-                <a:ea typeface="+mn-ea"/>
-                <a:cs typeface="+mn-cs"/>
-              </a:defRPr>
-            </a:lvl6pPr>
-            <a:lvl7pPr marL="2743200" algn="l" defTabSz="914400" rtl="0" eaLnBrk="1" latinLnBrk="0" hangingPunct="1">
-              <a:defRPr sz="1800" kern="1200">
-                <a:solidFill>
-                  <a:schemeClr val="tx1"/>
-                </a:solidFill>
-                <a:latin typeface="+mn-lt"/>
-                <a:ea typeface="+mn-ea"/>
-                <a:cs typeface="+mn-cs"/>
-              </a:defRPr>
-            </a:lvl7pPr>
-            <a:lvl8pPr marL="3200400" algn="l" defTabSz="914400" rtl="0" eaLnBrk="1" latinLnBrk="0" hangingPunct="1">
-              <a:defRPr sz="1800" kern="1200">
-                <a:solidFill>
-                  <a:schemeClr val="tx1"/>
-                </a:solidFill>
-                <a:latin typeface="+mn-lt"/>
-                <a:ea typeface="+mn-ea"/>
-                <a:cs typeface="+mn-cs"/>
-              </a:defRPr>
-            </a:lvl8pPr>
-            <a:lvl9pPr marL="3657600" algn="l" defTabSz="914400" rtl="0" eaLnBrk="1" latinLnBrk="0" hangingPunct="1">
-              <a:defRPr sz="1800" kern="1200">
-                <a:solidFill>
-                  <a:schemeClr val="tx1"/>
-                </a:solidFill>
-                <a:latin typeface="+mn-lt"/>
-                <a:ea typeface="+mn-ea"/>
-                <a:cs typeface="+mn-cs"/>
-              </a:defRPr>
-            </a:lvl9pPr>
-          </a:lstStyle>
+          <a:bodyPr/>
+          <a:lstStyle/>
           <a:p>
             <a:fld id="{3EBA5BD7-F043-4D1B-AA17-CD412FC534DE}" type="slidenum">
               <a:rPr lang="en-US" smtClean="0"/>
               <a:pPr/>
-              <a:t>46</a:t>
+              <a:t>45</a:t>
             </a:fld>
             <a:endParaRPr lang="en-US" dirty="0"/>
           </a:p>
@@ -1816,7 +1692,7 @@
           <p:cNvPr id="6" name="Footer Placeholder 7">
             <a:extLst>
               <a:ext uri="{FF2B5EF4-FFF2-40B4-BE49-F238E27FC236}">
-                <a16:creationId xmlns:a16="http://schemas.microsoft.com/office/drawing/2014/main" id="{3FAFC322-A821-4ED1-B86A-429BF73C1668}"/>
+                <a16:creationId xmlns:a16="http://schemas.microsoft.com/office/drawing/2014/main" id="{98538354-B696-480A-9C9C-21C1195F1A24}"/>
               </a:ext>
             </a:extLst>
           </p:cNvPr>
@@ -1864,7 +1740,7 @@
     </p:spTree>
     <p:extLst>
       <p:ext uri="{BB962C8B-B14F-4D97-AF65-F5344CB8AC3E}">
-        <p14:creationId xmlns:p14="http://schemas.microsoft.com/office/powerpoint/2010/main" val="532936466"/>
+        <p14:creationId xmlns:p14="http://schemas.microsoft.com/office/powerpoint/2010/main" val="2791254048"/>
       </p:ext>
     </p:extLst>
   </p:cSld>
@@ -1924,6 +1800,247 @@
       </p:sp>
       <p:sp>
         <p:nvSpPr>
+          <p:cNvPr id="7" name="Slide Number Placeholder 5">
+            <a:extLst>
+              <a:ext uri="{FF2B5EF4-FFF2-40B4-BE49-F238E27FC236}">
+                <a16:creationId xmlns:a16="http://schemas.microsoft.com/office/drawing/2014/main" id="{5049B984-F964-47FF-8179-0A3007CE21CD}"/>
+              </a:ext>
+            </a:extLst>
+          </p:cNvPr>
+          <p:cNvSpPr txBox="1">
+            <a:spLocks/>
+          </p:cNvSpPr>
+          <p:nvPr/>
+        </p:nvSpPr>
+        <p:spPr>
+          <a:xfrm>
+            <a:off x="6488999" y="8847000"/>
+            <a:ext cx="367414" cy="297000"/>
+          </a:xfrm>
+          <a:prstGeom prst="rect">
+            <a:avLst/>
+          </a:prstGeom>
+        </p:spPr>
+        <p:txBody>
+          <a:bodyPr vert="horz" lIns="91440" tIns="45720" rIns="91440" bIns="45720" rtlCol="0" anchor="b"/>
+          <a:lstStyle>
+            <a:defPPr>
+              <a:defRPr lang="en-US"/>
+            </a:defPPr>
+            <a:lvl1pPr marL="0" algn="r" defTabSz="914400" rtl="0" eaLnBrk="1" latinLnBrk="0" hangingPunct="1">
+              <a:defRPr sz="1200" kern="1200">
+                <a:solidFill>
+                  <a:schemeClr val="tx1"/>
+                </a:solidFill>
+                <a:latin typeface="+mn-lt"/>
+                <a:ea typeface="+mn-ea"/>
+                <a:cs typeface="+mn-cs"/>
+              </a:defRPr>
+            </a:lvl1pPr>
+            <a:lvl2pPr marL="457200" algn="l" defTabSz="914400" rtl="0" eaLnBrk="1" latinLnBrk="0" hangingPunct="1">
+              <a:defRPr sz="1800" kern="1200">
+                <a:solidFill>
+                  <a:schemeClr val="tx1"/>
+                </a:solidFill>
+                <a:latin typeface="+mn-lt"/>
+                <a:ea typeface="+mn-ea"/>
+                <a:cs typeface="+mn-cs"/>
+              </a:defRPr>
+            </a:lvl2pPr>
+            <a:lvl3pPr marL="914400" algn="l" defTabSz="914400" rtl="0" eaLnBrk="1" latinLnBrk="0" hangingPunct="1">
+              <a:defRPr sz="1800" kern="1200">
+                <a:solidFill>
+                  <a:schemeClr val="tx1"/>
+                </a:solidFill>
+                <a:latin typeface="+mn-lt"/>
+                <a:ea typeface="+mn-ea"/>
+                <a:cs typeface="+mn-cs"/>
+              </a:defRPr>
+            </a:lvl3pPr>
+            <a:lvl4pPr marL="1371600" algn="l" defTabSz="914400" rtl="0" eaLnBrk="1" latinLnBrk="0" hangingPunct="1">
+              <a:defRPr sz="1800" kern="1200">
+                <a:solidFill>
+                  <a:schemeClr val="tx1"/>
+                </a:solidFill>
+                <a:latin typeface="+mn-lt"/>
+                <a:ea typeface="+mn-ea"/>
+                <a:cs typeface="+mn-cs"/>
+              </a:defRPr>
+            </a:lvl4pPr>
+            <a:lvl5pPr marL="1828800" algn="l" defTabSz="914400" rtl="0" eaLnBrk="1" latinLnBrk="0" hangingPunct="1">
+              <a:defRPr sz="1800" kern="1200">
+                <a:solidFill>
+                  <a:schemeClr val="tx1"/>
+                </a:solidFill>
+                <a:latin typeface="+mn-lt"/>
+                <a:ea typeface="+mn-ea"/>
+                <a:cs typeface="+mn-cs"/>
+              </a:defRPr>
+            </a:lvl5pPr>
+            <a:lvl6pPr marL="2286000" algn="l" defTabSz="914400" rtl="0" eaLnBrk="1" latinLnBrk="0" hangingPunct="1">
+              <a:defRPr sz="1800" kern="1200">
+                <a:solidFill>
+                  <a:schemeClr val="tx1"/>
+                </a:solidFill>
+                <a:latin typeface="+mn-lt"/>
+                <a:ea typeface="+mn-ea"/>
+                <a:cs typeface="+mn-cs"/>
+              </a:defRPr>
+            </a:lvl6pPr>
+            <a:lvl7pPr marL="2743200" algn="l" defTabSz="914400" rtl="0" eaLnBrk="1" latinLnBrk="0" hangingPunct="1">
+              <a:defRPr sz="1800" kern="1200">
+                <a:solidFill>
+                  <a:schemeClr val="tx1"/>
+                </a:solidFill>
+                <a:latin typeface="+mn-lt"/>
+                <a:ea typeface="+mn-ea"/>
+                <a:cs typeface="+mn-cs"/>
+              </a:defRPr>
+            </a:lvl7pPr>
+            <a:lvl8pPr marL="3200400" algn="l" defTabSz="914400" rtl="0" eaLnBrk="1" latinLnBrk="0" hangingPunct="1">
+              <a:defRPr sz="1800" kern="1200">
+                <a:solidFill>
+                  <a:schemeClr val="tx1"/>
+                </a:solidFill>
+                <a:latin typeface="+mn-lt"/>
+                <a:ea typeface="+mn-ea"/>
+                <a:cs typeface="+mn-cs"/>
+              </a:defRPr>
+            </a:lvl8pPr>
+            <a:lvl9pPr marL="3657600" algn="l" defTabSz="914400" rtl="0" eaLnBrk="1" latinLnBrk="0" hangingPunct="1">
+              <a:defRPr sz="1800" kern="1200">
+                <a:solidFill>
+                  <a:schemeClr val="tx1"/>
+                </a:solidFill>
+                <a:latin typeface="+mn-lt"/>
+                <a:ea typeface="+mn-ea"/>
+                <a:cs typeface="+mn-cs"/>
+              </a:defRPr>
+            </a:lvl9pPr>
+          </a:lstStyle>
+          <a:p>
+            <a:fld id="{3EBA5BD7-F043-4D1B-AA17-CD412FC534DE}" type="slidenum">
+              <a:rPr lang="en-US" smtClean="0"/>
+              <a:pPr/>
+              <a:t>46</a:t>
+            </a:fld>
+            <a:endParaRPr lang="en-US" dirty="0"/>
+          </a:p>
+        </p:txBody>
+      </p:sp>
+      <p:sp>
+        <p:nvSpPr>
+          <p:cNvPr id="6" name="Footer Placeholder 7">
+            <a:extLst>
+              <a:ext uri="{FF2B5EF4-FFF2-40B4-BE49-F238E27FC236}">
+                <a16:creationId xmlns:a16="http://schemas.microsoft.com/office/drawing/2014/main" id="{3FAFC322-A821-4ED1-B86A-429BF73C1668}"/>
+              </a:ext>
+            </a:extLst>
+          </p:cNvPr>
+          <p:cNvSpPr>
+            <a:spLocks noGrp="1"/>
+          </p:cNvSpPr>
+          <p:nvPr>
+            <p:ph type="ftr" sz="quarter" idx="4"/>
+          </p:nvPr>
+        </p:nvSpPr>
+        <p:spPr>
+          <a:xfrm>
+            <a:off x="-1" y="8847000"/>
+            <a:ext cx="6488999" cy="297000"/>
+          </a:xfrm>
+          <a:prstGeom prst="rect">
+            <a:avLst/>
+          </a:prstGeom>
+        </p:spPr>
+        <p:txBody>
+          <a:bodyPr vert="horz" lIns="91440" tIns="45720" rIns="91440" bIns="45720" rtlCol="0" anchor="b"/>
+          <a:lstStyle>
+            <a:lvl1pPr algn="l">
+              <a:defRPr sz="1100"/>
+            </a:lvl1pPr>
+          </a:lstStyle>
+          <a:p>
+            <a:r>
+              <a:rPr lang="en-US" dirty="0"/>
+              <a:t>© SoftUni – </a:t>
+            </a:r>
+            <a:r>
+              <a:rPr lang="en-US" u="sng" dirty="0">
+                <a:hlinkClick r:id="rId3"/>
+              </a:rPr>
+              <a:t>https://softuni.org</a:t>
+            </a:r>
+            <a:r>
+              <a:rPr lang="en-US" dirty="0"/>
+              <a:t>. Copyrighted document. Unauthorized copy or reproduction is not permitted.</a:t>
+            </a:r>
+          </a:p>
+        </p:txBody>
+      </p:sp>
+    </p:spTree>
+    <p:extLst>
+      <p:ext uri="{BB962C8B-B14F-4D97-AF65-F5344CB8AC3E}">
+        <p14:creationId xmlns:p14="http://schemas.microsoft.com/office/powerpoint/2010/main" val="532936466"/>
+      </p:ext>
+    </p:extLst>
+  </p:cSld>
+  <p:clrMapOvr>
+    <a:masterClrMapping/>
+  </p:clrMapOvr>
+</p:notes>
+</file>
+
+<file path=ppt/notesSlides/notesSlide17.xml><?xml version="1.0" encoding="utf-8"?>
+<p:notes xmlns:a="http://schemas.openxmlformats.org/drawingml/2006/main" xmlns:r="http://schemas.openxmlformats.org/officeDocument/2006/relationships" xmlns:p="http://schemas.openxmlformats.org/presentationml/2006/main">
+  <p:cSld>
+    <p:spTree>
+      <p:nvGrpSpPr>
+        <p:cNvPr id="1" name=""/>
+        <p:cNvGrpSpPr/>
+        <p:nvPr/>
+      </p:nvGrpSpPr>
+      <p:grpSpPr>
+        <a:xfrm>
+          <a:off x="0" y="0"/>
+          <a:ext cx="0" cy="0"/>
+          <a:chOff x="0" y="0"/>
+          <a:chExt cx="0" cy="0"/>
+        </a:xfrm>
+      </p:grpSpPr>
+      <p:sp>
+        <p:nvSpPr>
+          <p:cNvPr id="2" name="Slide Image Placeholder 1"/>
+          <p:cNvSpPr>
+            <a:spLocks noGrp="1" noRot="1" noChangeAspect="1"/>
+          </p:cNvSpPr>
+          <p:nvPr>
+            <p:ph type="sldImg"/>
+          </p:nvPr>
+        </p:nvSpPr>
+        <p:spPr/>
+      </p:sp>
+      <p:sp>
+        <p:nvSpPr>
+          <p:cNvPr id="3" name="Notes Placeholder 2"/>
+          <p:cNvSpPr>
+            <a:spLocks noGrp="1"/>
+          </p:cNvSpPr>
+          <p:nvPr>
+            <p:ph type="body" idx="1"/>
+          </p:nvPr>
+        </p:nvSpPr>
+        <p:spPr/>
+        <p:txBody>
+          <a:bodyPr/>
+          <a:lstStyle/>
+          <a:p>
+            <a:endParaRPr lang="en-US"/>
+          </a:p>
+        </p:txBody>
+      </p:sp>
+      <p:sp>
+        <p:nvSpPr>
           <p:cNvPr id="6" name="Slide Number Placeholder 5">
             <a:extLst>
               <a:ext uri="{FF2B5EF4-FFF2-40B4-BE49-F238E27FC236}">
@@ -2115,7 +2232,7 @@
 </p:notes>
 </file>
 
-<file path=ppt/notesSlides/notesSlide17.xml><?xml version="1.0" encoding="utf-8"?>
+<file path=ppt/notesSlides/notesSlide18.xml><?xml version="1.0" encoding="utf-8"?>
 <p:notes xmlns:a="http://schemas.openxmlformats.org/drawingml/2006/main" xmlns:r="http://schemas.openxmlformats.org/officeDocument/2006/relationships" xmlns:p="http://schemas.openxmlformats.org/presentationml/2006/main">
   <p:cSld>
     <p:spTree>
@@ -10394,7 +10511,7 @@
         </p:nvSpPr>
         <p:spPr bwMode="auto">
           <a:xfrm>
-            <a:off x="3457767" y="3315581"/>
+            <a:off x="3586615" y="3315581"/>
             <a:ext cx="2842196" cy="531558"/>
           </a:xfrm>
           <a:prstGeom prst="rect">
@@ -10453,7 +10570,7 @@
         </p:nvSpPr>
         <p:spPr>
           <a:xfrm>
-            <a:off x="2820254" y="3429001"/>
+            <a:off x="2909622" y="3429000"/>
             <a:ext cx="457081" cy="304721"/>
           </a:xfrm>
           <a:prstGeom prst="rightArrow">
@@ -10635,7 +10752,7 @@
         </p:nvSpPr>
         <p:spPr bwMode="auto">
           <a:xfrm>
-            <a:off x="8645831" y="3315582"/>
+            <a:off x="8655199" y="3307447"/>
             <a:ext cx="2555126" cy="531558"/>
           </a:xfrm>
           <a:prstGeom prst="rect">
@@ -10694,7 +10811,7 @@
         </p:nvSpPr>
         <p:spPr>
           <a:xfrm>
-            <a:off x="7969691" y="3429001"/>
+            <a:off x="7969894" y="3426858"/>
             <a:ext cx="457081" cy="304721"/>
           </a:xfrm>
           <a:prstGeom prst="rightArrow">
@@ -10852,8 +10969,8 @@
         </p:nvSpPr>
         <p:spPr bwMode="auto">
           <a:xfrm>
-            <a:off x="306310" y="2286298"/>
-            <a:ext cx="1255472" cy="983618"/>
+            <a:off x="246000" y="2124000"/>
+            <a:ext cx="1315782" cy="945000"/>
           </a:xfrm>
           <a:prstGeom prst="wedgeRoundRectCallout">
             <a:avLst>
@@ -10863,15 +10980,15 @@
             </a:avLst>
           </a:prstGeom>
           <a:solidFill>
-            <a:srgbClr val="2E6770">
+            <a:schemeClr val="tx1">
               <a:alpha val="80000"/>
-            </a:srgbClr>
+            </a:schemeClr>
           </a:solidFill>
           <a:ln w="19050">
             <a:solidFill>
-              <a:srgbClr val="50A9B8">
+              <a:schemeClr val="tx2">
                 <a:alpha val="80000"/>
-              </a:srgbClr>
+              </a:schemeClr>
             </a:solidFill>
           </a:ln>
         </p:spPr>
@@ -10900,7 +11017,14 @@
           </a:bodyPr>
           <a:lstStyle/>
           <a:p>
-            <a:pPr algn="ctr"/>
+            <a:pPr algn="ctr">
+              <a:lnSpc>
+                <a:spcPts val="2600"/>
+              </a:lnSpc>
+              <a:spcBef>
+                <a:spcPts val="200"/>
+              </a:spcBef>
+            </a:pPr>
             <a:r>
               <a:rPr lang="bg-BG" sz="2800" b="1" dirty="0">
                 <a:solidFill>
@@ -10928,8 +11052,8 @@
         </p:nvSpPr>
         <p:spPr bwMode="auto">
           <a:xfrm>
-            <a:off x="2867251" y="4298158"/>
-            <a:ext cx="1255472" cy="983618"/>
+            <a:off x="3050051" y="4239000"/>
+            <a:ext cx="1255472" cy="900000"/>
           </a:xfrm>
           <a:prstGeom prst="wedgeRoundRectCallout">
             <a:avLst>
@@ -10939,15 +11063,15 @@
             </a:avLst>
           </a:prstGeom>
           <a:solidFill>
-            <a:srgbClr val="2E6770">
+            <a:schemeClr val="tx1">
               <a:alpha val="80000"/>
-            </a:srgbClr>
+            </a:schemeClr>
           </a:solidFill>
           <a:ln w="19050">
             <a:solidFill>
-              <a:srgbClr val="50A9B8">
+              <a:schemeClr val="tx2">
                 <a:alpha val="80000"/>
-              </a:srgbClr>
+              </a:schemeClr>
             </a:solidFill>
           </a:ln>
         </p:spPr>
@@ -10976,7 +11100,11 @@
           </a:bodyPr>
           <a:lstStyle/>
           <a:p>
-            <a:pPr algn="ctr"/>
+            <a:pPr algn="ctr">
+              <a:lnSpc>
+                <a:spcPts val="2600"/>
+              </a:lnSpc>
+            </a:pPr>
             <a:r>
               <a:rPr lang="bg-BG" sz="2800" b="1" dirty="0">
                 <a:solidFill>
@@ -11414,7 +11542,7 @@
                 <a:latin typeface="Consolas" pitchFamily="49" charset="0"/>
                 <a:cs typeface="Consolas" pitchFamily="49" charset="0"/>
               </a:rPr>
-              <a:t>// TODO: </a:t>
+              <a:t>// TODO: П</a:t>
             </a:r>
             <a:r>
               <a:rPr lang="bg-BG" sz="2499" b="1" noProof="1">
@@ -11424,7 +11552,7 @@
                 <a:latin typeface="Consolas" pitchFamily="49" charset="0"/>
                 <a:cs typeface="Consolas" pitchFamily="49" charset="0"/>
               </a:rPr>
-              <a:t>прочетете и пресметнете </a:t>
+              <a:t>рочетете и пресметнете </a:t>
             </a:r>
             <a:r>
               <a:rPr lang="en-US" sz="2499" b="1" noProof="1">
@@ -12945,7 +13073,7 @@
         </p:nvSpPr>
         <p:spPr bwMode="auto">
           <a:xfrm>
-            <a:off x="2215055" y="3070235"/>
+            <a:off x="2276466" y="2949785"/>
             <a:ext cx="1774557" cy="958429"/>
           </a:xfrm>
           <a:prstGeom prst="rect">
@@ -13040,7 +13168,7 @@
         </p:nvSpPr>
         <p:spPr>
           <a:xfrm>
-            <a:off x="1677552" y="3397088"/>
+            <a:off x="1662023" y="3380794"/>
             <a:ext cx="457081" cy="304721"/>
           </a:xfrm>
           <a:prstGeom prst="rightArrow">
@@ -13240,7 +13368,7 @@
         </p:nvSpPr>
         <p:spPr bwMode="auto">
           <a:xfrm>
-            <a:off x="6034288" y="3070234"/>
+            <a:off x="6103127" y="3053939"/>
             <a:ext cx="1717145" cy="958429"/>
           </a:xfrm>
           <a:prstGeom prst="rect">
@@ -13317,7 +13445,7 @@
         </p:nvSpPr>
         <p:spPr>
           <a:xfrm>
-            <a:off x="5472906" y="3397088"/>
+            <a:off x="5478544" y="3380794"/>
             <a:ext cx="457081" cy="304721"/>
           </a:xfrm>
           <a:prstGeom prst="rightArrow">
@@ -13483,7 +13611,7 @@
         </p:nvSpPr>
         <p:spPr bwMode="auto">
           <a:xfrm>
-            <a:off x="9865708" y="3070233"/>
+            <a:off x="9870358" y="2949785"/>
             <a:ext cx="1717145" cy="958429"/>
           </a:xfrm>
           <a:prstGeom prst="rect">
@@ -13560,7 +13688,7 @@
         </p:nvSpPr>
         <p:spPr>
           <a:xfrm>
-            <a:off x="9309964" y="3397088"/>
+            <a:off x="9296681" y="3380792"/>
             <a:ext cx="457081" cy="304721"/>
           </a:xfrm>
           <a:prstGeom prst="rightArrow">
@@ -14138,7 +14266,7 @@
                 <a:latin typeface="Consolas" pitchFamily="49" charset="0"/>
                 <a:cs typeface="Consolas" pitchFamily="49" charset="0"/>
               </a:rPr>
-              <a:t>// TODO: </a:t>
+              <a:t>// TODO: O</a:t>
             </a:r>
             <a:r>
               <a:rPr lang="bg-BG" sz="2400" b="1" noProof="1">
@@ -14148,7 +14276,7 @@
                 <a:latin typeface="Consolas" pitchFamily="49" charset="0"/>
                 <a:cs typeface="Consolas" pitchFamily="49" charset="0"/>
               </a:rPr>
-              <a:t>отпечатайте сумата</a:t>
+              <a:t>тпечатайте сумата</a:t>
             </a:r>
             <a:r>
               <a:rPr lang="en-US" sz="2400" b="1" noProof="1">
@@ -17505,26 +17633,26 @@
         </p:nvSpPr>
         <p:spPr bwMode="auto">
           <a:xfrm>
-            <a:off x="5410379" y="2677645"/>
-            <a:ext cx="4189909" cy="969955"/>
+            <a:off x="5410379" y="2619001"/>
+            <a:ext cx="3880621" cy="1028600"/>
           </a:xfrm>
           <a:prstGeom prst="wedgeRoundRectCallout">
             <a:avLst>
-              <a:gd name="adj1" fmla="val -56617"/>
-              <a:gd name="adj2" fmla="val -1295"/>
+              <a:gd name="adj1" fmla="val -61199"/>
+              <a:gd name="adj2" fmla="val -60"/>
               <a:gd name="adj3" fmla="val 16667"/>
             </a:avLst>
           </a:prstGeom>
           <a:solidFill>
-            <a:srgbClr val="2E6770">
+            <a:schemeClr val="tx1">
               <a:alpha val="80000"/>
-            </a:srgbClr>
+            </a:schemeClr>
           </a:solidFill>
           <a:ln w="19050">
             <a:solidFill>
-              <a:srgbClr val="50A9B8">
+              <a:schemeClr val="tx2">
                 <a:alpha val="80000"/>
-              </a:srgbClr>
+              </a:schemeClr>
             </a:solidFill>
           </a:ln>
         </p:spPr>
@@ -19660,15 +19788,15 @@
                 <a:latin typeface="Calibri" panose="020F0502020204030204" pitchFamily="34" charset="0"/>
                 <a:cs typeface="Calibri" panose="020F0502020204030204" pitchFamily="34" charset="0"/>
               </a:rPr>
-              <a:t>Работа с по-сложни </a:t>
+              <a:t>По-сложни </a:t>
             </a:r>
             <a:r>
               <a:rPr lang="en-US" sz="3399" b="1" dirty="0">
                 <a:solidFill>
                   <a:schemeClr val="bg1"/>
                 </a:solidFill>
-                <a:latin typeface="Calibri" panose="020F0502020204030204" pitchFamily="34" charset="0"/>
-                <a:cs typeface="Calibri" panose="020F0502020204030204" pitchFamily="34" charset="0"/>
+                <a:latin typeface="Consolas" panose="020B0609020204030204" pitchFamily="49" charset="0"/>
+                <a:cs typeface="Consolas" panose="020B0609020204030204" pitchFamily="49" charset="0"/>
               </a:rPr>
               <a:t>for-</a:t>
             </a:r>
@@ -19689,15 +19817,15 @@
                 <a:latin typeface="Calibri" panose="020F0502020204030204" pitchFamily="34" charset="0"/>
                 <a:cs typeface="Calibri" panose="020F0502020204030204" pitchFamily="34" charset="0"/>
               </a:rPr>
-              <a:t>Работа с по-сложни </a:t>
+              <a:t>По-сложни </a:t>
             </a:r>
             <a:r>
               <a:rPr lang="en-US" sz="3399" b="1" dirty="0">
                 <a:solidFill>
                   <a:schemeClr val="bg1"/>
                 </a:solidFill>
-                <a:latin typeface="Calibri" panose="020F0502020204030204" pitchFamily="34" charset="0"/>
-                <a:cs typeface="Calibri" panose="020F0502020204030204" pitchFamily="34" charset="0"/>
+                <a:latin typeface="Consolas" panose="020B0609020204030204" pitchFamily="49" charset="0"/>
+                <a:cs typeface="Consolas" panose="020B0609020204030204" pitchFamily="49" charset="0"/>
               </a:rPr>
               <a:t>while-</a:t>
             </a:r>
@@ -19725,7 +19853,7 @@
                 <a:latin typeface="Calibri" panose="020F0502020204030204" pitchFamily="34" charset="0"/>
                 <a:cs typeface="Calibri" panose="020F0502020204030204" pitchFamily="34" charset="0"/>
               </a:rPr>
-              <a:t>Работа с по-сложни </a:t>
+              <a:t>По-сложни </a:t>
             </a:r>
             <a:r>
               <a:rPr lang="bg-BG" sz="3399" b="1" dirty="0">
@@ -23943,7 +24071,7 @@
         </p:nvSpPr>
         <p:spPr>
           <a:xfrm>
-            <a:off x="4414593" y="2836303"/>
+            <a:off x="4414593" y="2852093"/>
             <a:ext cx="462346" cy="352552"/>
           </a:xfrm>
           <a:prstGeom prst="rightArrow">
@@ -23991,7 +24119,7 @@
         </p:nvSpPr>
         <p:spPr bwMode="auto">
           <a:xfrm>
-            <a:off x="5040423" y="2214318"/>
+            <a:off x="5111501" y="2218834"/>
             <a:ext cx="4035748" cy="1628105"/>
           </a:xfrm>
           <a:prstGeom prst="rect">
@@ -24170,7 +24298,7 @@
         </p:nvSpPr>
         <p:spPr>
           <a:xfrm>
-            <a:off x="4414593" y="4946449"/>
+            <a:off x="4414593" y="4946451"/>
             <a:ext cx="462346" cy="352552"/>
           </a:xfrm>
           <a:prstGeom prst="rightArrow">
@@ -24218,7 +24346,7 @@
         </p:nvSpPr>
         <p:spPr bwMode="auto">
           <a:xfrm>
-            <a:off x="5059360" y="4283779"/>
+            <a:off x="5111501" y="4308674"/>
             <a:ext cx="4035748" cy="1628105"/>
           </a:xfrm>
           <a:prstGeom prst="rect">
@@ -26781,8 +26909,8 @@
         </p:nvSpPr>
         <p:spPr bwMode="auto">
           <a:xfrm>
-            <a:off x="926877" y="1551776"/>
-            <a:ext cx="10338247" cy="4658224"/>
+            <a:off x="926877" y="1179000"/>
+            <a:ext cx="10338247" cy="5031000"/>
           </a:xfrm>
           <a:prstGeom prst="rect">
             <a:avLst/>
@@ -26874,25 +27002,18 @@
               </a:rPr>
               <a:t>  if (amount &lt; 0) { </a:t>
             </a:r>
-            <a:r>
+            <a:br>
               <a:rPr lang="en-US" sz="2399" b="1" noProof="1">
-                <a:solidFill>
-                  <a:schemeClr val="accent2"/>
-                </a:solidFill>
                 <a:latin typeface="Consolas" pitchFamily="49" charset="0"/>
                 <a:cs typeface="Consolas" pitchFamily="49" charset="0"/>
               </a:rPr>
-              <a:t>//TODO: </a:t>
-            </a:r>
-            <a:r>
-              <a:rPr lang="bg-BG" sz="2399" b="1" noProof="1">
-                <a:solidFill>
-                  <a:schemeClr val="accent2"/>
-                </a:solidFill>
+            </a:br>
+            <a:r>
+              <a:rPr lang="en-US" sz="2399" b="1" noProof="1">
                 <a:latin typeface="Consolas" pitchFamily="49" charset="0"/>
                 <a:cs typeface="Consolas" pitchFamily="49" charset="0"/>
               </a:rPr>
-              <a:t>Отпечатайте изхода</a:t>
+              <a:t>    </a:t>
             </a:r>
             <a:r>
               <a:rPr lang="en-US" sz="2399" b="1" noProof="1">
@@ -26902,7 +27023,7 @@
                 <a:latin typeface="Consolas" pitchFamily="49" charset="0"/>
                 <a:cs typeface="Consolas" pitchFamily="49" charset="0"/>
               </a:rPr>
-              <a:t> </a:t>
+              <a:t>//TODO: </a:t>
             </a:r>
             <a:r>
               <a:rPr lang="bg-BG" sz="2399" b="1" noProof="1">
@@ -26912,7 +27033,7 @@
                 <a:latin typeface="Consolas" pitchFamily="49" charset="0"/>
                 <a:cs typeface="Consolas" pitchFamily="49" charset="0"/>
               </a:rPr>
-              <a:t>и</a:t>
+              <a:t>Отпечатайте изхода</a:t>
             </a:r>
             <a:r>
               <a:rPr lang="en-US" sz="2399" b="1" noProof="1">
@@ -26932,7 +27053,7 @@
                 <a:latin typeface="Consolas" pitchFamily="49" charset="0"/>
                 <a:cs typeface="Consolas" pitchFamily="49" charset="0"/>
               </a:rPr>
-              <a:t>излезте от цикъла</a:t>
+              <a:t>и</a:t>
             </a:r>
             <a:r>
               <a:rPr lang="en-US" sz="2399" b="1" noProof="1">
@@ -26943,6 +27064,45 @@
                 <a:cs typeface="Consolas" pitchFamily="49" charset="0"/>
               </a:rPr>
               <a:t> </a:t>
+            </a:r>
+            <a:r>
+              <a:rPr lang="bg-BG" sz="2399" b="1" noProof="1">
+                <a:solidFill>
+                  <a:schemeClr val="accent2"/>
+                </a:solidFill>
+                <a:latin typeface="Consolas" pitchFamily="49" charset="0"/>
+                <a:cs typeface="Consolas" pitchFamily="49" charset="0"/>
+              </a:rPr>
+              <a:t>излезте от цикъла</a:t>
+            </a:r>
+            <a:r>
+              <a:rPr lang="en-US" sz="2399" b="1" noProof="1">
+                <a:solidFill>
+                  <a:schemeClr val="accent2"/>
+                </a:solidFill>
+                <a:latin typeface="Consolas" pitchFamily="49" charset="0"/>
+                <a:cs typeface="Consolas" pitchFamily="49" charset="0"/>
+              </a:rPr>
+              <a:t> </a:t>
+            </a:r>
+            <a:br>
+              <a:rPr lang="en-US" sz="2399" b="1" noProof="1">
+                <a:solidFill>
+                  <a:schemeClr val="accent2"/>
+                </a:solidFill>
+                <a:latin typeface="Consolas" pitchFamily="49" charset="0"/>
+                <a:cs typeface="Consolas" pitchFamily="49" charset="0"/>
+              </a:rPr>
+            </a:br>
+            <a:r>
+              <a:rPr lang="en-US" sz="2399" b="1" noProof="1">
+                <a:solidFill>
+                  <a:schemeClr val="accent2"/>
+                </a:solidFill>
+                <a:latin typeface="Consolas" pitchFamily="49" charset="0"/>
+                <a:cs typeface="Consolas" pitchFamily="49" charset="0"/>
+              </a:rPr>
+              <a:t>  </a:t>
             </a:r>
             <a:r>
               <a:rPr lang="en-US" sz="2399" b="1" noProof="1">
@@ -27423,39 +27583,26 @@
                                   </p:childTnLst>
                                 </p:cTn>
                               </p:par>
+                            </p:childTnLst>
+                          </p:cTn>
+                        </p:par>
+                      </p:childTnLst>
+                    </p:cTn>
+                  </p:par>
+                  <p:par>
+                    <p:cTn id="17" fill="hold">
+                      <p:stCondLst>
+                        <p:cond delay="indefinite"/>
+                      </p:stCondLst>
+                      <p:childTnLst>
+                        <p:par>
+                          <p:cTn id="18" fill="hold">
+                            <p:stCondLst>
+                              <p:cond delay="0"/>
+                            </p:stCondLst>
+                            <p:childTnLst>
                               <p:par>
-                                <p:cTn id="17" presetID="1" presetClass="entr" presetSubtype="0" fill="hold" nodeType="withEffect">
-                                  <p:stCondLst>
-                                    <p:cond delay="0"/>
-                                  </p:stCondLst>
-                                  <p:childTnLst>
-                                    <p:set>
-                                      <p:cBhvr>
-                                        <p:cTn id="18" dur="1" fill="hold">
-                                          <p:stCondLst>
-                                            <p:cond delay="0"/>
-                                          </p:stCondLst>
-                                        </p:cTn>
-                                        <p:tgtEl>
-                                          <p:spTgt spid="9">
-                                            <p:txEl>
-                                              <p:pRg st="6" end="6"/>
-                                            </p:txEl>
-                                          </p:spTgt>
-                                        </p:tgtEl>
-                                        <p:attrNameLst>
-                                          <p:attrName>style.visibility</p:attrName>
-                                        </p:attrNameLst>
-                                      </p:cBhvr>
-                                      <p:to>
-                                        <p:strVal val="visible"/>
-                                      </p:to>
-                                    </p:set>
-                                  </p:childTnLst>
-                                </p:cTn>
-                              </p:par>
-                              <p:par>
-                                <p:cTn id="19" presetID="1" presetClass="entr" presetSubtype="0" fill="hold" nodeType="withEffect">
+                                <p:cTn id="19" presetID="1" presetClass="entr" presetSubtype="0" fill="hold" nodeType="clickEffect">
                                   <p:stCondLst>
                                     <p:cond delay="0"/>
                                   </p:stCondLst>
@@ -27470,7 +27617,7 @@
                                         <p:tgtEl>
                                           <p:spTgt spid="9">
                                             <p:txEl>
-                                              <p:pRg st="7" end="7"/>
+                                              <p:pRg st="6" end="6"/>
                                             </p:txEl>
                                           </p:spTgt>
                                         </p:tgtEl>
@@ -27501,6 +27648,37 @@
                                         <p:tgtEl>
                                           <p:spTgt spid="9">
                                             <p:txEl>
+                                              <p:pRg st="7" end="7"/>
+                                            </p:txEl>
+                                          </p:spTgt>
+                                        </p:tgtEl>
+                                        <p:attrNameLst>
+                                          <p:attrName>style.visibility</p:attrName>
+                                        </p:attrNameLst>
+                                      </p:cBhvr>
+                                      <p:to>
+                                        <p:strVal val="visible"/>
+                                      </p:to>
+                                    </p:set>
+                                  </p:childTnLst>
+                                </p:cTn>
+                              </p:par>
+                              <p:par>
+                                <p:cTn id="23" presetID="1" presetClass="entr" presetSubtype="0" fill="hold" nodeType="withEffect">
+                                  <p:stCondLst>
+                                    <p:cond delay="0"/>
+                                  </p:stCondLst>
+                                  <p:childTnLst>
+                                    <p:set>
+                                      <p:cBhvr>
+                                        <p:cTn id="24" dur="1" fill="hold">
+                                          <p:stCondLst>
+                                            <p:cond delay="0"/>
+                                          </p:stCondLst>
+                                        </p:cTn>
+                                        <p:tgtEl>
+                                          <p:spTgt spid="9">
+                                            <p:txEl>
                                               <p:pRg st="8" end="8"/>
                                             </p:txEl>
                                           </p:spTgt>
@@ -27523,26 +27701,26 @@
                     </p:cTn>
                   </p:par>
                   <p:par>
-                    <p:cTn id="23" fill="hold">
+                    <p:cTn id="25" fill="hold">
                       <p:stCondLst>
                         <p:cond delay="indefinite"/>
                       </p:stCondLst>
                       <p:childTnLst>
                         <p:par>
-                          <p:cTn id="24" fill="hold">
+                          <p:cTn id="26" fill="hold">
                             <p:stCondLst>
                               <p:cond delay="0"/>
                             </p:stCondLst>
                             <p:childTnLst>
                               <p:par>
-                                <p:cTn id="25" presetID="1" presetClass="entr" presetSubtype="0" fill="hold" nodeType="clickEffect">
+                                <p:cTn id="27" presetID="1" presetClass="entr" presetSubtype="0" fill="hold" nodeType="clickEffect">
                                   <p:stCondLst>
                                     <p:cond delay="0"/>
                                   </p:stCondLst>
                                   <p:childTnLst>
                                     <p:set>
                                       <p:cBhvr>
-                                        <p:cTn id="26" dur="1" fill="hold">
+                                        <p:cTn id="28" dur="1" fill="hold">
                                           <p:stCondLst>
                                             <p:cond delay="0"/>
                                           </p:stCondLst>
@@ -29321,7 +29499,7 @@
         </p:nvSpPr>
         <p:spPr>
           <a:xfrm>
-            <a:off x="1737769" y="3771810"/>
+            <a:off x="1735903" y="3771809"/>
             <a:ext cx="457081" cy="304721"/>
           </a:xfrm>
           <a:prstGeom prst="rightArrow">
@@ -29363,7 +29541,7 @@
         </p:nvSpPr>
         <p:spPr bwMode="auto">
           <a:xfrm>
-            <a:off x="2363174" y="3427123"/>
+            <a:off x="2325929" y="3431413"/>
             <a:ext cx="3580467" cy="994098"/>
           </a:xfrm>
           <a:prstGeom prst="rect">
@@ -29641,7 +29819,7 @@
         </p:nvSpPr>
         <p:spPr>
           <a:xfrm>
-            <a:off x="7575742" y="3772076"/>
+            <a:off x="7583102" y="3771808"/>
             <a:ext cx="457081" cy="304721"/>
           </a:xfrm>
           <a:prstGeom prst="rightArrow">
@@ -30200,7 +30378,7 @@
                 <a:latin typeface="Consolas" pitchFamily="49" charset="0"/>
                 <a:cs typeface="Consolas" pitchFamily="49" charset="0"/>
               </a:rPr>
-              <a:t>инкрементирайте </a:t>
+              <a:t>Инкрементирайте </a:t>
             </a:r>
             <a:r>
               <a:rPr lang="en-US" sz="2199" b="1" noProof="1">
@@ -30344,7 +30522,7 @@
                 <a:latin typeface="Consolas" pitchFamily="49" charset="0"/>
                 <a:cs typeface="Consolas" pitchFamily="49" charset="0"/>
               </a:rPr>
-              <a:t>добавете оценката към сумата и увеличете броя на оценките</a:t>
+              <a:t>Добавете оценката към сумата и увеличете броя на оценките</a:t>
             </a:r>
             <a:endParaRPr lang="en-US" sz="2199" b="1" noProof="1">
               <a:latin typeface="Consolas" pitchFamily="49" charset="0"/>
@@ -30407,7 +30585,7 @@
                 <a:latin typeface="Consolas" pitchFamily="49" charset="0"/>
                 <a:cs typeface="Consolas" pitchFamily="49" charset="0"/>
               </a:rPr>
-              <a:t>отпечатайте изхода</a:t>
+              <a:t>Отпечатайте изхода</a:t>
             </a:r>
           </a:p>
         </p:txBody>
@@ -34404,15 +34582,15 @@
             </a:avLst>
           </a:prstGeom>
           <a:solidFill>
-            <a:srgbClr val="2E6770">
+            <a:schemeClr val="tx1">
               <a:alpha val="80000"/>
-            </a:srgbClr>
+            </a:schemeClr>
           </a:solidFill>
           <a:ln w="19050">
             <a:solidFill>
-              <a:srgbClr val="50A9B8">
+              <a:schemeClr val="tx2">
                 <a:alpha val="80000"/>
-              </a:srgbClr>
+              </a:schemeClr>
             </a:solidFill>
           </a:ln>
         </p:spPr>
@@ -34470,7 +34648,7 @@
         <p:spPr bwMode="auto">
           <a:xfrm>
             <a:off x="4439817" y="2752072"/>
-            <a:ext cx="3408687" cy="601823"/>
+            <a:ext cx="3231183" cy="601823"/>
           </a:xfrm>
           <a:prstGeom prst="wedgeRoundRectCallout">
             <a:avLst>
@@ -34480,15 +34658,15 @@
             </a:avLst>
           </a:prstGeom>
           <a:solidFill>
-            <a:srgbClr val="2E6770">
+            <a:schemeClr val="tx1">
               <a:alpha val="80000"/>
-            </a:srgbClr>
+            </a:schemeClr>
           </a:solidFill>
           <a:ln w="19050">
             <a:solidFill>
-              <a:srgbClr val="50A9B8">
+              <a:schemeClr val="tx2">
                 <a:alpha val="80000"/>
-              </a:srgbClr>
+              </a:schemeClr>
             </a:solidFill>
           </a:ln>
         </p:spPr>
@@ -34766,7 +34944,7 @@
                             </p:stCondLst>
                             <p:childTnLst>
                               <p:par>
-                                <p:cTn id="5" presetID="1" presetClass="entr" presetSubtype="0" fill="hold" nodeType="clickEffect">
+                                <p:cTn id="5" presetID="1" presetClass="entr" presetSubtype="0" fill="hold" grpId="0" nodeType="clickEffect">
                                   <p:stCondLst>
                                     <p:cond delay="0"/>
                                   </p:stCondLst>
@@ -34774,6 +34952,96 @@
                                     <p:set>
                                       <p:cBhvr>
                                         <p:cTn id="6" dur="1" fill="hold">
+                                          <p:stCondLst>
+                                            <p:cond delay="0"/>
+                                          </p:stCondLst>
+                                        </p:cTn>
+                                        <p:tgtEl>
+                                          <p:spTgt spid="7"/>
+                                        </p:tgtEl>
+                                        <p:attrNameLst>
+                                          <p:attrName>style.visibility</p:attrName>
+                                        </p:attrNameLst>
+                                      </p:cBhvr>
+                                      <p:to>
+                                        <p:strVal val="visible"/>
+                                      </p:to>
+                                    </p:set>
+                                  </p:childTnLst>
+                                </p:cTn>
+                              </p:par>
+                            </p:childTnLst>
+                          </p:cTn>
+                        </p:par>
+                      </p:childTnLst>
+                    </p:cTn>
+                  </p:par>
+                  <p:par>
+                    <p:cTn id="7" fill="hold">
+                      <p:stCondLst>
+                        <p:cond delay="indefinite"/>
+                      </p:stCondLst>
+                      <p:childTnLst>
+                        <p:par>
+                          <p:cTn id="8" fill="hold">
+                            <p:stCondLst>
+                              <p:cond delay="0"/>
+                            </p:stCondLst>
+                            <p:childTnLst>
+                              <p:par>
+                                <p:cTn id="9" presetID="1" presetClass="entr" presetSubtype="0" fill="hold" grpId="0" nodeType="clickEffect">
+                                  <p:stCondLst>
+                                    <p:cond delay="0"/>
+                                  </p:stCondLst>
+                                  <p:childTnLst>
+                                    <p:set>
+                                      <p:cBhvr>
+                                        <p:cTn id="10" dur="1" fill="hold">
+                                          <p:stCondLst>
+                                            <p:cond delay="0"/>
+                                          </p:stCondLst>
+                                        </p:cTn>
+                                        <p:tgtEl>
+                                          <p:spTgt spid="6"/>
+                                        </p:tgtEl>
+                                        <p:attrNameLst>
+                                          <p:attrName>style.visibility</p:attrName>
+                                        </p:attrNameLst>
+                                      </p:cBhvr>
+                                      <p:to>
+                                        <p:strVal val="visible"/>
+                                      </p:to>
+                                    </p:set>
+                                  </p:childTnLst>
+                                </p:cTn>
+                              </p:par>
+                            </p:childTnLst>
+                          </p:cTn>
+                        </p:par>
+                      </p:childTnLst>
+                    </p:cTn>
+                  </p:par>
+                  <p:par>
+                    <p:cTn id="11" fill="hold">
+                      <p:stCondLst>
+                        <p:cond delay="indefinite"/>
+                      </p:stCondLst>
+                      <p:childTnLst>
+                        <p:par>
+                          <p:cTn id="12" fill="hold">
+                            <p:stCondLst>
+                              <p:cond delay="0"/>
+                            </p:stCondLst>
+                            <p:childTnLst>
+                              <p:par>
+                                <p:cTn id="13" presetID="1" presetClass="entr" presetSubtype="0" fill="hold" nodeType="clickEffect">
+                                  <p:stCondLst>
+                                    <p:cond delay="0"/>
+                                  </p:stCondLst>
+                                  <p:childTnLst>
+                                    <p:set>
+                                      <p:cBhvr>
+                                        <p:cTn id="14" dur="1" fill="hold">
                                           <p:stCondLst>
                                             <p:cond delay="0"/>
                                           </p:stCondLst>
@@ -34797,14 +35065,14 @@
                                 </p:cTn>
                               </p:par>
                               <p:par>
-                                <p:cTn id="7" presetID="1" presetClass="entr" presetSubtype="0" fill="hold" nodeType="withEffect">
+                                <p:cTn id="15" presetID="1" presetClass="entr" presetSubtype="0" fill="hold" nodeType="withEffect">
                                   <p:stCondLst>
                                     <p:cond delay="0"/>
                                   </p:stCondLst>
                                   <p:childTnLst>
                                     <p:set>
                                       <p:cBhvr>
-                                        <p:cTn id="8" dur="1" fill="hold">
+                                        <p:cTn id="16" dur="1" fill="hold">
                                           <p:stCondLst>
                                             <p:cond delay="0"/>
                                           </p:stCondLst>
@@ -34834,26 +35102,26 @@
                     </p:cTn>
                   </p:par>
                   <p:par>
-                    <p:cTn id="9" fill="hold">
+                    <p:cTn id="17" fill="hold">
                       <p:stCondLst>
                         <p:cond delay="indefinite"/>
                       </p:stCondLst>
                       <p:childTnLst>
                         <p:par>
-                          <p:cTn id="10" fill="hold">
+                          <p:cTn id="18" fill="hold">
                             <p:stCondLst>
                               <p:cond delay="0"/>
                             </p:stCondLst>
                             <p:childTnLst>
                               <p:par>
-                                <p:cTn id="11" presetID="1" presetClass="entr" presetSubtype="0" fill="hold" nodeType="clickEffect">
+                                <p:cTn id="19" presetID="1" presetClass="entr" presetSubtype="0" fill="hold" nodeType="clickEffect">
                                   <p:stCondLst>
                                     <p:cond delay="0"/>
                                   </p:stCondLst>
                                   <p:childTnLst>
                                     <p:set>
                                       <p:cBhvr>
-                                        <p:cTn id="12" dur="1" fill="hold">
+                                        <p:cTn id="20" dur="1" fill="hold">
                                           <p:stCondLst>
                                             <p:cond delay="0"/>
                                           </p:stCondLst>
@@ -34877,101 +35145,7 @@
                                 </p:cTn>
                               </p:par>
                               <p:par>
-                                <p:cTn id="13" presetID="1" presetClass="entr" presetSubtype="0" fill="hold" nodeType="withEffect">
-                                  <p:stCondLst>
-                                    <p:cond delay="0"/>
-                                  </p:stCondLst>
-                                  <p:childTnLst>
-                                    <p:set>
-                                      <p:cBhvr>
-                                        <p:cTn id="14" dur="1" fill="hold">
-                                          <p:stCondLst>
-                                            <p:cond delay="0"/>
-                                          </p:stCondLst>
-                                        </p:cTn>
-                                        <p:tgtEl>
-                                          <p:spTgt spid="5">
-                                            <p:txEl>
-                                              <p:pRg st="10" end="10"/>
-                                            </p:txEl>
-                                          </p:spTgt>
-                                        </p:tgtEl>
-                                        <p:attrNameLst>
-                                          <p:attrName>style.visibility</p:attrName>
-                                        </p:attrNameLst>
-                                      </p:cBhvr>
-                                      <p:to>
-                                        <p:strVal val="visible"/>
-                                      </p:to>
-                                    </p:set>
-                                  </p:childTnLst>
-                                </p:cTn>
-                              </p:par>
-                            </p:childTnLst>
-                          </p:cTn>
-                        </p:par>
-                      </p:childTnLst>
-                    </p:cTn>
-                  </p:par>
-                  <p:par>
-                    <p:cTn id="15" fill="hold">
-                      <p:stCondLst>
-                        <p:cond delay="indefinite"/>
-                      </p:stCondLst>
-                      <p:childTnLst>
-                        <p:par>
-                          <p:cTn id="16" fill="hold">
-                            <p:stCondLst>
-                              <p:cond delay="0"/>
-                            </p:stCondLst>
-                            <p:childTnLst>
-                              <p:par>
-                                <p:cTn id="17" presetID="1" presetClass="entr" presetSubtype="0" fill="hold" grpId="0" nodeType="clickEffect">
-                                  <p:stCondLst>
-                                    <p:cond delay="0"/>
-                                  </p:stCondLst>
-                                  <p:childTnLst>
-                                    <p:set>
-                                      <p:cBhvr>
-                                        <p:cTn id="18" dur="1" fill="hold">
-                                          <p:stCondLst>
-                                            <p:cond delay="0"/>
-                                          </p:stCondLst>
-                                        </p:cTn>
-                                        <p:tgtEl>
-                                          <p:spTgt spid="7"/>
-                                        </p:tgtEl>
-                                        <p:attrNameLst>
-                                          <p:attrName>style.visibility</p:attrName>
-                                        </p:attrNameLst>
-                                      </p:cBhvr>
-                                      <p:to>
-                                        <p:strVal val="visible"/>
-                                      </p:to>
-                                    </p:set>
-                                  </p:childTnLst>
-                                </p:cTn>
-                              </p:par>
-                            </p:childTnLst>
-                          </p:cTn>
-                        </p:par>
-                      </p:childTnLst>
-                    </p:cTn>
-                  </p:par>
-                  <p:par>
-                    <p:cTn id="19" fill="hold">
-                      <p:stCondLst>
-                        <p:cond delay="indefinite"/>
-                      </p:stCondLst>
-                      <p:childTnLst>
-                        <p:par>
-                          <p:cTn id="20" fill="hold">
-                            <p:stCondLst>
-                              <p:cond delay="0"/>
-                            </p:stCondLst>
-                            <p:childTnLst>
-                              <p:par>
-                                <p:cTn id="21" presetID="1" presetClass="entr" presetSubtype="0" fill="hold" grpId="0" nodeType="clickEffect">
+                                <p:cTn id="21" presetID="1" presetClass="entr" presetSubtype="0" fill="hold" nodeType="withEffect">
                                   <p:stCondLst>
                                     <p:cond delay="0"/>
                                   </p:stCondLst>
@@ -34984,7 +35158,11 @@
                                           </p:stCondLst>
                                         </p:cTn>
                                         <p:tgtEl>
-                                          <p:spTgt spid="6"/>
+                                          <p:spTgt spid="5">
+                                            <p:txEl>
+                                              <p:pRg st="10" end="10"/>
+                                            </p:txEl>
+                                          </p:spTgt>
                                         </p:tgtEl>
                                         <p:attrNameLst>
                                           <p:attrName>style.visibility</p:attrName>
@@ -35229,7 +35407,7 @@
           <a:p>
             <a:r>
               <a:rPr lang="bg-BG" dirty="0"/>
-              <a:t>За прекъсване на вложени цикли, използваме булеви </a:t>
+              <a:t>За прекъсване на вложени цикли използваме булеви </a:t>
             </a:r>
             <a:br>
               <a:rPr lang="bg-BG" dirty="0"/>
@@ -35512,8 +35690,8 @@
         </p:nvSpPr>
         <p:spPr bwMode="auto">
           <a:xfrm>
-            <a:off x="193480" y="3763943"/>
-            <a:ext cx="3455668" cy="1474002"/>
+            <a:off x="183500" y="4103999"/>
+            <a:ext cx="3465648" cy="1133945"/>
           </a:xfrm>
           <a:prstGeom prst="wedgeRoundRectCallout">
             <a:avLst>
@@ -35583,7 +35761,7 @@
                   <a:schemeClr val="bg2"/>
                 </a:solidFill>
               </a:rPr>
-              <a:t>само ако стойността на </a:t>
+              <a:t>ако </a:t>
             </a:r>
             <a:r>
               <a:rPr lang="en-US" sz="2399" b="1" dirty="0">
@@ -35599,12 +35777,15 @@
                   <a:schemeClr val="bg2"/>
                 </a:solidFill>
               </a:rPr>
-              <a:t>бъде </a:t>
+              <a:t>е </a:t>
             </a:r>
             <a:r>
               <a:rPr lang="en-US" sz="2399" b="1" dirty="0">
                 <a:solidFill>
-                  <a:schemeClr val="bg2"/>
+                  <a:schemeClr val="bg1">
+                    <a:lumMod val="60000"/>
+                    <a:lumOff val="40000"/>
+                  </a:schemeClr>
                 </a:solidFill>
               </a:rPr>
               <a:t>true</a:t>
@@ -36987,7 +37168,7 @@
                                         <p:tgtEl>
                                           <p:spTgt spid="3">
                                             <p:txEl>
-                                              <p:pRg st="1" end="1"/>
+                                              <p:pRg st="2" end="2"/>
                                             </p:txEl>
                                           </p:spTgt>
                                         </p:tgtEl>
@@ -37036,7 +37217,7 @@
                                         <p:tgtEl>
                                           <p:spTgt spid="3">
                                             <p:txEl>
-                                              <p:pRg st="2" end="2"/>
+                                              <p:pRg st="3" end="3"/>
                                             </p:txEl>
                                           </p:spTgt>
                                         </p:tgtEl>
@@ -37051,26 +37232,35 @@
                                   </p:childTnLst>
                                 </p:cTn>
                               </p:par>
-                            </p:childTnLst>
-                          </p:cTn>
-                        </p:par>
-                      </p:childTnLst>
-                    </p:cTn>
-                  </p:par>
-                  <p:par>
-                    <p:cTn id="11" fill="hold">
-                      <p:stCondLst>
-                        <p:cond delay="indefinite"/>
-                      </p:stCondLst>
-                      <p:childTnLst>
-                        <p:par>
-                          <p:cTn id="12" fill="hold">
-                            <p:stCondLst>
-                              <p:cond delay="0"/>
-                            </p:stCondLst>
-                            <p:childTnLst>
                               <p:par>
-                                <p:cTn id="13" presetID="1" presetClass="entr" presetSubtype="0" fill="hold" nodeType="clickEffect">
+                                <p:cTn id="11" presetID="1" presetClass="entr" presetSubtype="0" fill="hold" grpId="0" nodeType="withEffect">
+                                  <p:stCondLst>
+                                    <p:cond delay="0"/>
+                                  </p:stCondLst>
+                                  <p:childTnLst>
+                                    <p:set>
+                                      <p:cBhvr>
+                                        <p:cTn id="12" dur="1" fill="hold">
+                                          <p:stCondLst>
+                                            <p:cond delay="0"/>
+                                          </p:stCondLst>
+                                        </p:cTn>
+                                        <p:tgtEl>
+                                          <p:spTgt spid="11"/>
+                                        </p:tgtEl>
+                                        <p:attrNameLst>
+                                          <p:attrName>style.visibility</p:attrName>
+                                        </p:attrNameLst>
+                                      </p:cBhvr>
+                                      <p:to>
+                                        <p:strVal val="visible"/>
+                                      </p:to>
+                                    </p:set>
+                                  </p:childTnLst>
+                                </p:cTn>
+                              </p:par>
+                              <p:par>
+                                <p:cTn id="13" presetID="1" presetClass="entr" presetSubtype="0" fill="hold" grpId="0" nodeType="withEffect">
                                   <p:stCondLst>
                                     <p:cond delay="0"/>
                                   </p:stCondLst>
@@ -37083,11 +37273,7 @@
                                           </p:stCondLst>
                                         </p:cTn>
                                         <p:tgtEl>
-                                          <p:spTgt spid="3">
-                                            <p:txEl>
-                                              <p:pRg st="3" end="3"/>
-                                            </p:txEl>
-                                          </p:spTgt>
+                                          <p:spTgt spid="12"/>
                                         </p:tgtEl>
                                         <p:attrNameLst>
                                           <p:attrName>style.visibility</p:attrName>
@@ -37114,7 +37300,7 @@
                                           </p:stCondLst>
                                         </p:cTn>
                                         <p:tgtEl>
-                                          <p:spTgt spid="11"/>
+                                          <p:spTgt spid="13"/>
                                         </p:tgtEl>
                                         <p:attrNameLst>
                                           <p:attrName>style.visibility</p:attrName>
@@ -37141,7 +37327,7 @@
                                           </p:stCondLst>
                                         </p:cTn>
                                         <p:tgtEl>
-                                          <p:spTgt spid="12"/>
+                                          <p:spTgt spid="10"/>
                                         </p:tgtEl>
                                         <p:attrNameLst>
                                           <p:attrName>style.visibility</p:attrName>
@@ -37168,7 +37354,7 @@
                                           </p:stCondLst>
                                         </p:cTn>
                                         <p:tgtEl>
-                                          <p:spTgt spid="13"/>
+                                          <p:spTgt spid="9"/>
                                         </p:tgtEl>
                                         <p:attrNameLst>
                                           <p:attrName>style.visibility</p:attrName>
@@ -37190,60 +37376,6 @@
                                     <p:set>
                                       <p:cBhvr>
                                         <p:cTn id="22" dur="1" fill="hold">
-                                          <p:stCondLst>
-                                            <p:cond delay="0"/>
-                                          </p:stCondLst>
-                                        </p:cTn>
-                                        <p:tgtEl>
-                                          <p:spTgt spid="10"/>
-                                        </p:tgtEl>
-                                        <p:attrNameLst>
-                                          <p:attrName>style.visibility</p:attrName>
-                                        </p:attrNameLst>
-                                      </p:cBhvr>
-                                      <p:to>
-                                        <p:strVal val="visible"/>
-                                      </p:to>
-                                    </p:set>
-                                  </p:childTnLst>
-                                </p:cTn>
-                              </p:par>
-                              <p:par>
-                                <p:cTn id="23" presetID="1" presetClass="entr" presetSubtype="0" fill="hold" grpId="0" nodeType="withEffect">
-                                  <p:stCondLst>
-                                    <p:cond delay="0"/>
-                                  </p:stCondLst>
-                                  <p:childTnLst>
-                                    <p:set>
-                                      <p:cBhvr>
-                                        <p:cTn id="24" dur="1" fill="hold">
-                                          <p:stCondLst>
-                                            <p:cond delay="0"/>
-                                          </p:stCondLst>
-                                        </p:cTn>
-                                        <p:tgtEl>
-                                          <p:spTgt spid="9"/>
-                                        </p:tgtEl>
-                                        <p:attrNameLst>
-                                          <p:attrName>style.visibility</p:attrName>
-                                        </p:attrNameLst>
-                                      </p:cBhvr>
-                                      <p:to>
-                                        <p:strVal val="visible"/>
-                                      </p:to>
-                                    </p:set>
-                                  </p:childTnLst>
-                                </p:cTn>
-                              </p:par>
-                              <p:par>
-                                <p:cTn id="25" presetID="1" presetClass="entr" presetSubtype="0" fill="hold" grpId="0" nodeType="withEffect">
-                                  <p:stCondLst>
-                                    <p:cond delay="0"/>
-                                  </p:stCondLst>
-                                  <p:childTnLst>
-                                    <p:set>
-                                      <p:cBhvr>
-                                        <p:cTn id="26" dur="1" fill="hold">
                                           <p:stCondLst>
                                             <p:cond delay="0"/>
                                           </p:stCondLst>
@@ -41396,7 +41528,7 @@
                 <a:latin typeface="Consolas" pitchFamily="49" charset="0"/>
                 <a:cs typeface="Consolas" pitchFamily="49" charset="0"/>
               </a:rPr>
-              <a:t>отпечатайте в зависимост от</a:t>
+              <a:t>Отпечатайте в зависимост от</a:t>
             </a:r>
             <a:br>
               <a:rPr lang="bg-BG" sz="2399" b="1" dirty="0">
@@ -41536,8 +41668,8 @@
         </p:nvSpPr>
         <p:spPr bwMode="auto">
           <a:xfrm>
-            <a:off x="8783516" y="2375887"/>
-            <a:ext cx="3199567" cy="1199837"/>
+            <a:off x="8783517" y="2529000"/>
+            <a:ext cx="3072484" cy="1046724"/>
           </a:xfrm>
           <a:prstGeom prst="wedgeRoundRectCallout">
             <a:avLst>
@@ -42870,10 +43002,23 @@
                     <a:lumOff val="40000"/>
                   </a:schemeClr>
                 </a:solidFill>
+                <a:latin typeface="Consolas" panose="020B0609020204030204" pitchFamily="49" charset="0"/>
+                <a:cs typeface="Consolas" panose="020B0609020204030204" pitchFamily="49" charset="0"/>
+              </a:rPr>
+              <a:t>for</a:t>
+            </a:r>
+            <a:r>
+              <a:rPr lang="en-US" sz="3600" b="1" dirty="0">
+                <a:solidFill>
+                  <a:schemeClr val="accent1">
+                    <a:lumMod val="60000"/>
+                    <a:lumOff val="40000"/>
+                  </a:schemeClr>
+                </a:solidFill>
                 <a:latin typeface="Calibri" panose="020F0502020204030204" pitchFamily="34" charset="0"/>
                 <a:cs typeface="Calibri" panose="020F0502020204030204" pitchFamily="34" charset="0"/>
               </a:rPr>
-              <a:t>for-</a:t>
+              <a:t>-</a:t>
             </a:r>
             <a:r>
               <a:rPr lang="bg-BG" sz="3600" b="1" dirty="0">
@@ -42911,23 +43056,6 @@
                 <a:latin typeface="Calibri" panose="020F0502020204030204" pitchFamily="34" charset="0"/>
                 <a:cs typeface="Calibri" panose="020F0502020204030204" pitchFamily="34" charset="0"/>
               </a:rPr>
-              <a:t>Работа с текст</a:t>
-            </a:r>
-          </a:p>
-          <a:p>
-            <a:pPr marL="456428" indent="-456428" latinLnBrk="0">
-              <a:lnSpc>
-                <a:spcPct val="100000"/>
-              </a:lnSpc>
-            </a:pPr>
-            <a:r>
-              <a:rPr lang="bg-BG" sz="3600" dirty="0">
-                <a:solidFill>
-                  <a:schemeClr val="bg2"/>
-                </a:solidFill>
-                <a:latin typeface="Calibri" panose="020F0502020204030204" pitchFamily="34" charset="0"/>
-                <a:cs typeface="Calibri" panose="020F0502020204030204" pitchFamily="34" charset="0"/>
-              </a:rPr>
               <a:t>Работа с по-сложни </a:t>
             </a:r>
             <a:r>
@@ -42938,8 +43066,8 @@
                     <a:lumOff val="40000"/>
                   </a:schemeClr>
                 </a:solidFill>
-                <a:latin typeface="Calibri" panose="020F0502020204030204" pitchFamily="34" charset="0"/>
-                <a:cs typeface="Calibri" panose="020F0502020204030204" pitchFamily="34" charset="0"/>
+                <a:latin typeface="Consolas" panose="020B0609020204030204" pitchFamily="49" charset="0"/>
+                <a:cs typeface="Consolas" panose="020B0609020204030204" pitchFamily="49" charset="0"/>
               </a:rPr>
               <a:t>while-</a:t>
             </a:r>
@@ -43204,55 +43332,6 @@
                       </p:childTnLst>
                     </p:cTn>
                   </p:par>
-                  <p:par>
-                    <p:cTn id="11" fill="hold">
-                      <p:stCondLst>
-                        <p:cond delay="indefinite"/>
-                      </p:stCondLst>
-                      <p:childTnLst>
-                        <p:par>
-                          <p:cTn id="12" fill="hold">
-                            <p:stCondLst>
-                              <p:cond delay="0"/>
-                            </p:stCondLst>
-                            <p:childTnLst>
-                              <p:par>
-                                <p:cTn id="13" presetID="1" presetClass="entr" presetSubtype="0" fill="hold" nodeType="clickEffect">
-                                  <p:stCondLst>
-                                    <p:cond delay="0"/>
-                                  </p:stCondLst>
-                                  <p:childTnLst>
-                                    <p:set>
-                                      <p:cBhvr>
-                                        <p:cTn id="14" dur="1" fill="hold">
-                                          <p:stCondLst>
-                                            <p:cond delay="0"/>
-                                          </p:stCondLst>
-                                        </p:cTn>
-                                        <p:tgtEl>
-                                          <p:spTgt spid="15">
-                                            <p:txEl>
-                                              <p:pRg st="3" end="3"/>
-                                            </p:txEl>
-                                          </p:spTgt>
-                                        </p:tgtEl>
-                                        <p:attrNameLst>
-                                          <p:attrName>style.visibility</p:attrName>
-                                        </p:attrNameLst>
-                                      </p:cBhvr>
-                                      <p:to>
-                                        <p:strVal val="visible"/>
-                                      </p:to>
-                                    </p:set>
-                                  </p:childTnLst>
-                                </p:cTn>
-                              </p:par>
-                            </p:childTnLst>
-                          </p:cTn>
-                        </p:par>
-                      </p:childTnLst>
-                    </p:cTn>
-                  </p:par>
                 </p:childTnLst>
               </p:cTn>
               <p:prevCondLst>
@@ -44300,15 +44379,15 @@
             </a:avLst>
           </a:prstGeom>
           <a:solidFill>
-            <a:srgbClr val="2E6770">
+            <a:schemeClr val="tx1">
               <a:alpha val="80000"/>
-            </a:srgbClr>
+            </a:schemeClr>
           </a:solidFill>
           <a:ln w="19050">
             <a:solidFill>
-              <a:srgbClr val="50A9B8">
+              <a:schemeClr val="tx2">
                 <a:alpha val="80000"/>
-              </a:srgbClr>
+              </a:schemeClr>
             </a:solidFill>
           </a:ln>
         </p:spPr>
@@ -44363,7 +44442,7 @@
         </p:nvSpPr>
         <p:spPr>
           <a:xfrm>
-            <a:off x="1001271" y="6339646"/>
+            <a:off x="1001271" y="6256369"/>
             <a:ext cx="10305559" cy="399981"/>
           </a:xfrm>
           <a:prstGeom prst="rect">

</xml_diff>